<commit_message>
:memo: docs: Update PPT
</commit_message>
<xml_diff>
--- a/Progress Report/presentation.pptx
+++ b/Progress Report/presentation.pptx
@@ -4,6 +4,9 @@
   <p:sldMasterIdLst>
     <p:sldMasterId id="2147483648" r:id="rId1"/>
   </p:sldMasterIdLst>
+  <p:notesMasterIdLst>
+    <p:notesMasterId r:id="rId18"/>
+  </p:notesMasterIdLst>
   <p:sldIdLst>
     <p:sldId id="256" r:id="rId2"/>
     <p:sldId id="257" r:id="rId3"/>
@@ -122,6 +125,355 @@
 </p:presentation>
 </file>
 
+<file path=ppt/notesMasters/notesMaster1.xml><?xml version="1.0" encoding="utf-8"?>
+<p:notesMaster xmlns:a="http://schemas.openxmlformats.org/drawingml/2006/main" xmlns:r="http://schemas.openxmlformats.org/officeDocument/2006/relationships" xmlns:p="http://schemas.openxmlformats.org/presentationml/2006/main">
+  <p:cSld>
+    <p:bg>
+      <p:bgRef idx="1001">
+        <a:schemeClr val="bg1"/>
+      </p:bgRef>
+    </p:bg>
+    <p:spTree>
+      <p:nvGrpSpPr>
+        <p:cNvPr id="1" name=""/>
+        <p:cNvGrpSpPr/>
+        <p:nvPr/>
+      </p:nvGrpSpPr>
+      <p:grpSpPr>
+        <a:xfrm>
+          <a:off x="0" y="0"/>
+          <a:ext cx="0" cy="0"/>
+          <a:chOff x="0" y="0"/>
+          <a:chExt cx="0" cy="0"/>
+        </a:xfrm>
+      </p:grpSpPr>
+      <p:sp>
+        <p:nvSpPr>
+          <p:cNvPr id="2" name="Header Placeholder 1"/>
+          <p:cNvSpPr>
+            <a:spLocks noGrp="1"/>
+          </p:cNvSpPr>
+          <p:nvPr>
+            <p:ph type="hdr" sz="quarter"/>
+          </p:nvPr>
+        </p:nvSpPr>
+        <p:spPr>
+          <a:xfrm>
+            <a:off x="0" y="0"/>
+            <a:ext cx="2971800" cy="458788"/>
+          </a:xfrm>
+          <a:prstGeom prst="rect">
+            <a:avLst/>
+          </a:prstGeom>
+        </p:spPr>
+        <p:txBody>
+          <a:bodyPr vert="horz" lIns="91440" tIns="45720" rIns="91440" bIns="45720" rtlCol="0"/>
+          <a:lstStyle>
+            <a:lvl1pPr algn="l">
+              <a:defRPr sz="1200"/>
+            </a:lvl1pPr>
+          </a:lstStyle>
+          <a:p>
+            <a:endParaRPr lang="en-US"/>
+          </a:p>
+        </p:txBody>
+      </p:sp>
+      <p:sp>
+        <p:nvSpPr>
+          <p:cNvPr id="3" name="Date Placeholder 2"/>
+          <p:cNvSpPr>
+            <a:spLocks noGrp="1"/>
+          </p:cNvSpPr>
+          <p:nvPr>
+            <p:ph type="dt" idx="1"/>
+          </p:nvPr>
+        </p:nvSpPr>
+        <p:spPr>
+          <a:xfrm>
+            <a:off x="3884613" y="0"/>
+            <a:ext cx="2971800" cy="458788"/>
+          </a:xfrm>
+          <a:prstGeom prst="rect">
+            <a:avLst/>
+          </a:prstGeom>
+        </p:spPr>
+        <p:txBody>
+          <a:bodyPr vert="horz" lIns="91440" tIns="45720" rIns="91440" bIns="45720" rtlCol="0"/>
+          <a:lstStyle>
+            <a:lvl1pPr algn="r">
+              <a:defRPr sz="1200"/>
+            </a:lvl1pPr>
+          </a:lstStyle>
+          <a:p>
+            <a:fld id="{2CB9604B-9A86-41F5-A160-2D8E9613976B}" type="datetimeFigureOut">
+              <a:rPr lang="en-US" smtClean="0"/>
+              <a:t>11/30/2022</a:t>
+            </a:fld>
+            <a:endParaRPr lang="en-US"/>
+          </a:p>
+        </p:txBody>
+      </p:sp>
+      <p:sp>
+        <p:nvSpPr>
+          <p:cNvPr id="4" name="Slide Image Placeholder 3"/>
+          <p:cNvSpPr>
+            <a:spLocks noGrp="1" noRot="1" noChangeAspect="1"/>
+          </p:cNvSpPr>
+          <p:nvPr>
+            <p:ph type="sldImg" idx="2"/>
+          </p:nvPr>
+        </p:nvSpPr>
+        <p:spPr>
+          <a:xfrm>
+            <a:off x="685800" y="1143000"/>
+            <a:ext cx="5486400" cy="3086100"/>
+          </a:xfrm>
+          <a:prstGeom prst="rect">
+            <a:avLst/>
+          </a:prstGeom>
+          <a:noFill/>
+          <a:ln w="12700">
+            <a:solidFill>
+              <a:prstClr val="black"/>
+            </a:solidFill>
+          </a:ln>
+        </p:spPr>
+        <p:txBody>
+          <a:bodyPr vert="horz" lIns="91440" tIns="45720" rIns="91440" bIns="45720" rtlCol="0" anchor="ctr"/>
+          <a:lstStyle/>
+          <a:p>
+            <a:endParaRPr lang="en-US"/>
+          </a:p>
+        </p:txBody>
+      </p:sp>
+      <p:sp>
+        <p:nvSpPr>
+          <p:cNvPr id="5" name="Notes Placeholder 4"/>
+          <p:cNvSpPr>
+            <a:spLocks noGrp="1"/>
+          </p:cNvSpPr>
+          <p:nvPr>
+            <p:ph type="body" sz="quarter" idx="3"/>
+          </p:nvPr>
+        </p:nvSpPr>
+        <p:spPr>
+          <a:xfrm>
+            <a:off x="685800" y="4400550"/>
+            <a:ext cx="5486400" cy="3600450"/>
+          </a:xfrm>
+          <a:prstGeom prst="rect">
+            <a:avLst/>
+          </a:prstGeom>
+        </p:spPr>
+        <p:txBody>
+          <a:bodyPr vert="horz" lIns="91440" tIns="45720" rIns="91440" bIns="45720" rtlCol="0"/>
+          <a:lstStyle/>
+          <a:p>
+            <a:pPr lvl="0"/>
+            <a:r>
+              <a:rPr lang="en-US"/>
+              <a:t>Edit Master text styles</a:t>
+            </a:r>
+          </a:p>
+          <a:p>
+            <a:pPr lvl="1"/>
+            <a:r>
+              <a:rPr lang="en-US"/>
+              <a:t>Second level</a:t>
+            </a:r>
+          </a:p>
+          <a:p>
+            <a:pPr lvl="2"/>
+            <a:r>
+              <a:rPr lang="en-US"/>
+              <a:t>Third level</a:t>
+            </a:r>
+          </a:p>
+          <a:p>
+            <a:pPr lvl="3"/>
+            <a:r>
+              <a:rPr lang="en-US"/>
+              <a:t>Fourth level</a:t>
+            </a:r>
+          </a:p>
+          <a:p>
+            <a:pPr lvl="4"/>
+            <a:r>
+              <a:rPr lang="en-US"/>
+              <a:t>Fifth level</a:t>
+            </a:r>
+          </a:p>
+        </p:txBody>
+      </p:sp>
+      <p:sp>
+        <p:nvSpPr>
+          <p:cNvPr id="6" name="Footer Placeholder 5"/>
+          <p:cNvSpPr>
+            <a:spLocks noGrp="1"/>
+          </p:cNvSpPr>
+          <p:nvPr>
+            <p:ph type="ftr" sz="quarter" idx="4"/>
+          </p:nvPr>
+        </p:nvSpPr>
+        <p:spPr>
+          <a:xfrm>
+            <a:off x="0" y="8685213"/>
+            <a:ext cx="2971800" cy="458787"/>
+          </a:xfrm>
+          <a:prstGeom prst="rect">
+            <a:avLst/>
+          </a:prstGeom>
+        </p:spPr>
+        <p:txBody>
+          <a:bodyPr vert="horz" lIns="91440" tIns="45720" rIns="91440" bIns="45720" rtlCol="0" anchor="b"/>
+          <a:lstStyle>
+            <a:lvl1pPr algn="l">
+              <a:defRPr sz="1200"/>
+            </a:lvl1pPr>
+          </a:lstStyle>
+          <a:p>
+            <a:endParaRPr lang="en-US"/>
+          </a:p>
+        </p:txBody>
+      </p:sp>
+      <p:sp>
+        <p:nvSpPr>
+          <p:cNvPr id="7" name="Slide Number Placeholder 6"/>
+          <p:cNvSpPr>
+            <a:spLocks noGrp="1"/>
+          </p:cNvSpPr>
+          <p:nvPr>
+            <p:ph type="sldNum" sz="quarter" idx="5"/>
+          </p:nvPr>
+        </p:nvSpPr>
+        <p:spPr>
+          <a:xfrm>
+            <a:off x="3884613" y="8685213"/>
+            <a:ext cx="2971800" cy="458787"/>
+          </a:xfrm>
+          <a:prstGeom prst="rect">
+            <a:avLst/>
+          </a:prstGeom>
+        </p:spPr>
+        <p:txBody>
+          <a:bodyPr vert="horz" lIns="91440" tIns="45720" rIns="91440" bIns="45720" rtlCol="0" anchor="b"/>
+          <a:lstStyle>
+            <a:lvl1pPr algn="r">
+              <a:defRPr sz="1200"/>
+            </a:lvl1pPr>
+          </a:lstStyle>
+          <a:p>
+            <a:fld id="{4B17B559-FC9C-477A-9C5B-80CC9ED7A601}" type="slidenum">
+              <a:rPr lang="en-US" smtClean="0"/>
+              <a:t>‹#›</a:t>
+            </a:fld>
+            <a:endParaRPr lang="en-US"/>
+          </a:p>
+        </p:txBody>
+      </p:sp>
+    </p:spTree>
+    <p:extLst>
+      <p:ext uri="{BB962C8B-B14F-4D97-AF65-F5344CB8AC3E}">
+        <p14:creationId xmlns:p14="http://schemas.microsoft.com/office/powerpoint/2010/main" val="3188057370"/>
+      </p:ext>
+    </p:extLst>
+  </p:cSld>
+  <p:clrMap bg1="lt1" tx1="dk1" bg2="lt2" tx2="dk2" accent1="accent1" accent2="accent2" accent3="accent3" accent4="accent4" accent5="accent5" accent6="accent6" hlink="hlink" folHlink="folHlink"/>
+  <p:notesStyle>
+    <a:lvl1pPr marL="0" algn="l" defTabSz="914400" rtl="0" eaLnBrk="1" latinLnBrk="0" hangingPunct="1">
+      <a:defRPr sz="1200" kern="1200">
+        <a:solidFill>
+          <a:schemeClr val="tx1"/>
+        </a:solidFill>
+        <a:latin typeface="+mn-lt"/>
+        <a:ea typeface="+mn-ea"/>
+        <a:cs typeface="+mn-cs"/>
+      </a:defRPr>
+    </a:lvl1pPr>
+    <a:lvl2pPr marL="457200" algn="l" defTabSz="914400" rtl="0" eaLnBrk="1" latinLnBrk="0" hangingPunct="1">
+      <a:defRPr sz="1200" kern="1200">
+        <a:solidFill>
+          <a:schemeClr val="tx1"/>
+        </a:solidFill>
+        <a:latin typeface="+mn-lt"/>
+        <a:ea typeface="+mn-ea"/>
+        <a:cs typeface="+mn-cs"/>
+      </a:defRPr>
+    </a:lvl2pPr>
+    <a:lvl3pPr marL="914400" algn="l" defTabSz="914400" rtl="0" eaLnBrk="1" latinLnBrk="0" hangingPunct="1">
+      <a:defRPr sz="1200" kern="1200">
+        <a:solidFill>
+          <a:schemeClr val="tx1"/>
+        </a:solidFill>
+        <a:latin typeface="+mn-lt"/>
+        <a:ea typeface="+mn-ea"/>
+        <a:cs typeface="+mn-cs"/>
+      </a:defRPr>
+    </a:lvl3pPr>
+    <a:lvl4pPr marL="1371600" algn="l" defTabSz="914400" rtl="0" eaLnBrk="1" latinLnBrk="0" hangingPunct="1">
+      <a:defRPr sz="1200" kern="1200">
+        <a:solidFill>
+          <a:schemeClr val="tx1"/>
+        </a:solidFill>
+        <a:latin typeface="+mn-lt"/>
+        <a:ea typeface="+mn-ea"/>
+        <a:cs typeface="+mn-cs"/>
+      </a:defRPr>
+    </a:lvl4pPr>
+    <a:lvl5pPr marL="1828800" algn="l" defTabSz="914400" rtl="0" eaLnBrk="1" latinLnBrk="0" hangingPunct="1">
+      <a:defRPr sz="1200" kern="1200">
+        <a:solidFill>
+          <a:schemeClr val="tx1"/>
+        </a:solidFill>
+        <a:latin typeface="+mn-lt"/>
+        <a:ea typeface="+mn-ea"/>
+        <a:cs typeface="+mn-cs"/>
+      </a:defRPr>
+    </a:lvl5pPr>
+    <a:lvl6pPr marL="2286000" algn="l" defTabSz="914400" rtl="0" eaLnBrk="1" latinLnBrk="0" hangingPunct="1">
+      <a:defRPr sz="1200" kern="1200">
+        <a:solidFill>
+          <a:schemeClr val="tx1"/>
+        </a:solidFill>
+        <a:latin typeface="+mn-lt"/>
+        <a:ea typeface="+mn-ea"/>
+        <a:cs typeface="+mn-cs"/>
+      </a:defRPr>
+    </a:lvl6pPr>
+    <a:lvl7pPr marL="2743200" algn="l" defTabSz="914400" rtl="0" eaLnBrk="1" latinLnBrk="0" hangingPunct="1">
+      <a:defRPr sz="1200" kern="1200">
+        <a:solidFill>
+          <a:schemeClr val="tx1"/>
+        </a:solidFill>
+        <a:latin typeface="+mn-lt"/>
+        <a:ea typeface="+mn-ea"/>
+        <a:cs typeface="+mn-cs"/>
+      </a:defRPr>
+    </a:lvl7pPr>
+    <a:lvl8pPr marL="3200400" algn="l" defTabSz="914400" rtl="0" eaLnBrk="1" latinLnBrk="0" hangingPunct="1">
+      <a:defRPr sz="1200" kern="1200">
+        <a:solidFill>
+          <a:schemeClr val="tx1"/>
+        </a:solidFill>
+        <a:latin typeface="+mn-lt"/>
+        <a:ea typeface="+mn-ea"/>
+        <a:cs typeface="+mn-cs"/>
+      </a:defRPr>
+    </a:lvl8pPr>
+    <a:lvl9pPr marL="3657600" algn="l" defTabSz="914400" rtl="0" eaLnBrk="1" latinLnBrk="0" hangingPunct="1">
+      <a:defRPr sz="1200" kern="1200">
+        <a:solidFill>
+          <a:schemeClr val="tx1"/>
+        </a:solidFill>
+        <a:latin typeface="+mn-lt"/>
+        <a:ea typeface="+mn-ea"/>
+        <a:cs typeface="+mn-cs"/>
+      </a:defRPr>
+    </a:lvl9pPr>
+  </p:notesStyle>
+</p:notesMaster>
+</file>
+
 <file path=ppt/slideLayouts/slideLayout1.xml><?xml version="1.0" encoding="utf-8"?>
 <p:sldLayout xmlns:a="http://schemas.openxmlformats.org/drawingml/2006/main" xmlns:r="http://schemas.openxmlformats.org/officeDocument/2006/relationships" xmlns:p="http://schemas.openxmlformats.org/presentationml/2006/main" type="titleOnly" preserve="1">
   <p:cSld name="Title Only">
@@ -144,7 +496,7 @@
           <p:cNvPr id="2" name="Title 1">
             <a:extLst>
               <a:ext uri="{FF2B5EF4-FFF2-40B4-BE49-F238E27FC236}">
-                <a16:creationId xmlns:a16="http://schemas.microsoft.com/office/drawing/2014/main" id="{5B53C5D1-178E-41BD-AA0E-7069276FE92F}"/>
+                <a16:creationId xmlns:a16="http://schemas.microsoft.com/office/drawing/2014/main" id="{959B5173-AA94-427D-8CB2-5C589D190086}"/>
               </a:ext>
             </a:extLst>
           </p:cNvPr>
@@ -172,7 +524,7 @@
           <p:cNvPr id="3" name="Date Placeholder 2">
             <a:extLst>
               <a:ext uri="{FF2B5EF4-FFF2-40B4-BE49-F238E27FC236}">
-                <a16:creationId xmlns:a16="http://schemas.microsoft.com/office/drawing/2014/main" id="{F8B4993E-2427-446F-B195-C7C00E4287E9}"/>
+                <a16:creationId xmlns:a16="http://schemas.microsoft.com/office/drawing/2014/main" id="{3901839B-708A-4C61-8029-1FFE55F4E51A}"/>
               </a:ext>
             </a:extLst>
           </p:cNvPr>
@@ -188,7 +540,7 @@
           <a:bodyPr/>
           <a:lstStyle/>
           <a:p>
-            <a:fld id="{9B97DA4E-9BAC-4C07-A9A4-65A05CBDEB40}" type="datetimeFigureOut">
+            <a:fld id="{AE375F57-C97B-4AF0-8B81-20947787992B}" type="datetime1">
               <a:rPr lang="en-US" smtClean="0"/>
               <a:t>11/30/2022</a:t>
             </a:fld>
@@ -201,7 +553,7 @@
           <p:cNvPr id="4" name="Footer Placeholder 3">
             <a:extLst>
               <a:ext uri="{FF2B5EF4-FFF2-40B4-BE49-F238E27FC236}">
-                <a16:creationId xmlns:a16="http://schemas.microsoft.com/office/drawing/2014/main" id="{7AFD2EE7-0B59-4E32-A9CF-EC762F488D5F}"/>
+                <a16:creationId xmlns:a16="http://schemas.microsoft.com/office/drawing/2014/main" id="{F4C34CCA-F2F9-4D15-8D15-140598282CE1}"/>
               </a:ext>
             </a:extLst>
           </p:cNvPr>
@@ -226,7 +578,7 @@
           <p:cNvPr id="5" name="Slide Number Placeholder 4">
             <a:extLst>
               <a:ext uri="{FF2B5EF4-FFF2-40B4-BE49-F238E27FC236}">
-                <a16:creationId xmlns:a16="http://schemas.microsoft.com/office/drawing/2014/main" id="{65A58D20-78EB-4DC4-969E-6C1935E926C1}"/>
+                <a16:creationId xmlns:a16="http://schemas.microsoft.com/office/drawing/2014/main" id="{C24CA90A-9010-4E24-B5BA-CA424B13DBA8}"/>
               </a:ext>
             </a:extLst>
           </p:cNvPr>
@@ -242,7 +594,7 @@
           <a:bodyPr/>
           <a:lstStyle/>
           <a:p>
-            <a:fld id="{3FDDF8F4-E471-4C52-A630-95DCBF4E8A04}" type="slidenum">
+            <a:fld id="{48EAAD28-6291-48B7-87C0-79E56BC93411}" type="slidenum">
               <a:rPr lang="en-US" smtClean="0"/>
               <a:t>‹#›</a:t>
             </a:fld>
@@ -253,7 +605,7 @@
     </p:spTree>
     <p:extLst>
       <p:ext uri="{BB962C8B-B14F-4D97-AF65-F5344CB8AC3E}">
-        <p14:creationId xmlns:p14="http://schemas.microsoft.com/office/powerpoint/2010/main" val="1272163989"/>
+        <p14:creationId xmlns:p14="http://schemas.microsoft.com/office/powerpoint/2010/main" val="126911757"/>
       </p:ext>
     </p:extLst>
   </p:cSld>
@@ -290,7 +642,7 @@
           <p:cNvPr id="2" name="Title Placeholder 1">
             <a:extLst>
               <a:ext uri="{FF2B5EF4-FFF2-40B4-BE49-F238E27FC236}">
-                <a16:creationId xmlns:a16="http://schemas.microsoft.com/office/drawing/2014/main" id="{EB86D2D1-8939-47D5-9AF0-57BE34DE72A7}"/>
+                <a16:creationId xmlns:a16="http://schemas.microsoft.com/office/drawing/2014/main" id="{D5B4681E-020E-44E4-9B19-B3C852CDCDE7}"/>
               </a:ext>
             </a:extLst>
           </p:cNvPr>
@@ -328,7 +680,7 @@
           <p:cNvPr id="3" name="Text Placeholder 2">
             <a:extLst>
               <a:ext uri="{FF2B5EF4-FFF2-40B4-BE49-F238E27FC236}">
-                <a16:creationId xmlns:a16="http://schemas.microsoft.com/office/drawing/2014/main" id="{21135C7F-6AA4-45BC-B8E0-68096F3A589A}"/>
+                <a16:creationId xmlns:a16="http://schemas.microsoft.com/office/drawing/2014/main" id="{DC84A646-CF62-422E-95D6-4256E16FA095}"/>
               </a:ext>
             </a:extLst>
           </p:cNvPr>
@@ -395,7 +747,7 @@
           <p:cNvPr id="4" name="Date Placeholder 3">
             <a:extLst>
               <a:ext uri="{FF2B5EF4-FFF2-40B4-BE49-F238E27FC236}">
-                <a16:creationId xmlns:a16="http://schemas.microsoft.com/office/drawing/2014/main" id="{26B6D0F3-F43A-4797-A5A9-2C5EAB025818}"/>
+                <a16:creationId xmlns:a16="http://schemas.microsoft.com/office/drawing/2014/main" id="{2DE88046-3FFB-4492-A2A5-4E3F2607DA49}"/>
               </a:ext>
             </a:extLst>
           </p:cNvPr>
@@ -429,7 +781,7 @@
             </a:lvl1pPr>
           </a:lstStyle>
           <a:p>
-            <a:fld id="{9B97DA4E-9BAC-4C07-A9A4-65A05CBDEB40}" type="datetimeFigureOut">
+            <a:fld id="{E33996E4-850B-43AE-9D3A-555CCBFCE194}" type="datetime1">
               <a:rPr lang="en-US" smtClean="0"/>
               <a:t>11/30/2022</a:t>
             </a:fld>
@@ -442,7 +794,7 @@
           <p:cNvPr id="5" name="Footer Placeholder 4">
             <a:extLst>
               <a:ext uri="{FF2B5EF4-FFF2-40B4-BE49-F238E27FC236}">
-                <a16:creationId xmlns:a16="http://schemas.microsoft.com/office/drawing/2014/main" id="{DD81C6EB-D38C-49BC-9A45-88B4D564A1C0}"/>
+                <a16:creationId xmlns:a16="http://schemas.microsoft.com/office/drawing/2014/main" id="{3C8A0863-FF23-4E1C-921F-8F48D6933EC4}"/>
               </a:ext>
             </a:extLst>
           </p:cNvPr>
@@ -485,7 +837,7 @@
           <p:cNvPr id="6" name="Slide Number Placeholder 5">
             <a:extLst>
               <a:ext uri="{FF2B5EF4-FFF2-40B4-BE49-F238E27FC236}">
-                <a16:creationId xmlns:a16="http://schemas.microsoft.com/office/drawing/2014/main" id="{9DC0DFB9-EC04-48E9-A2F9-84327AA001E7}"/>
+                <a16:creationId xmlns:a16="http://schemas.microsoft.com/office/drawing/2014/main" id="{75E5E634-4089-418D-875C-35899FE34CBE}"/>
               </a:ext>
             </a:extLst>
           </p:cNvPr>
@@ -519,7 +871,7 @@
             </a:lvl1pPr>
           </a:lstStyle>
           <a:p>
-            <a:fld id="{3FDDF8F4-E471-4C52-A630-95DCBF4E8A04}" type="slidenum">
+            <a:fld id="{48EAAD28-6291-48B7-87C0-79E56BC93411}" type="slidenum">
               <a:rPr lang="en-US" smtClean="0"/>
               <a:t>‹#›</a:t>
             </a:fld>
@@ -530,7 +882,7 @@
     </p:spTree>
     <p:extLst>
       <p:ext uri="{BB962C8B-B14F-4D97-AF65-F5344CB8AC3E}">
-        <p14:creationId xmlns:p14="http://schemas.microsoft.com/office/powerpoint/2010/main" val="3220259832"/>
+        <p14:creationId xmlns:p14="http://schemas.microsoft.com/office/powerpoint/2010/main" val="2890091016"/>
       </p:ext>
     </p:extLst>
   </p:cSld>
@@ -538,6 +890,7 @@
   <p:sldLayoutIdLst>
     <p:sldLayoutId id="2147483654" r:id="rId1"/>
   </p:sldLayoutIdLst>
+  <p:hf hdr="0" ftr="0" dt="0"/>
   <p:txStyles>
     <p:titleStyle>
       <a:lvl1pPr algn="l" defTabSz="1371600" rtl="0" eaLnBrk="1" latinLnBrk="0" hangingPunct="1">
@@ -849,7 +1202,7 @@
           <p:cNvPr id="2" name="Title 1" hidden="1">
             <a:extLst>
               <a:ext uri="{FF2B5EF4-FFF2-40B4-BE49-F238E27FC236}">
-                <a16:creationId xmlns:a16="http://schemas.microsoft.com/office/drawing/2014/main" id="{EB21941A-E186-4C96-9E22-8B63C990A8F6}"/>
+                <a16:creationId xmlns:a16="http://schemas.microsoft.com/office/drawing/2014/main" id="{7BBDDEC8-59CE-4A98-BB91-7521375F7748}"/>
               </a:ext>
             </a:extLst>
           </p:cNvPr>
@@ -874,7 +1227,7 @@
           <p:cNvPr id="3" name="Picture 2">
             <a:extLst>
               <a:ext uri="{FF2B5EF4-FFF2-40B4-BE49-F238E27FC236}">
-                <a16:creationId xmlns:a16="http://schemas.microsoft.com/office/drawing/2014/main" id="{8007813B-8F7D-43E9-BA9F-86A7860A2016}"/>
+                <a16:creationId xmlns:a16="http://schemas.microsoft.com/office/drawing/2014/main" id="{5E4C9436-8275-4FB8-9043-F1FB18DF4BB1}"/>
               </a:ext>
             </a:extLst>
           </p:cNvPr>
@@ -897,10 +1250,39 @@
           </a:prstGeom>
         </p:spPr>
       </p:pic>
+      <p:sp>
+        <p:nvSpPr>
+          <p:cNvPr id="4" name="Slide Number Placeholder 3">
+            <a:extLst>
+              <a:ext uri="{FF2B5EF4-FFF2-40B4-BE49-F238E27FC236}">
+                <a16:creationId xmlns:a16="http://schemas.microsoft.com/office/drawing/2014/main" id="{CCA9A294-7801-45DD-BE2C-BFB668D60730}"/>
+              </a:ext>
+            </a:extLst>
+          </p:cNvPr>
+          <p:cNvSpPr>
+            <a:spLocks noGrp="1"/>
+          </p:cNvSpPr>
+          <p:nvPr>
+            <p:ph type="sldNum" sz="quarter" idx="12"/>
+          </p:nvPr>
+        </p:nvSpPr>
+        <p:spPr/>
+        <p:txBody>
+          <a:bodyPr/>
+          <a:lstStyle/>
+          <a:p>
+            <a:fld id="{48EAAD28-6291-48B7-87C0-79E56BC93411}" type="slidenum">
+              <a:rPr lang="en-US" smtClean="0"/>
+              <a:t>1</a:t>
+            </a:fld>
+            <a:endParaRPr lang="en-US"/>
+          </a:p>
+        </p:txBody>
+      </p:sp>
     </p:spTree>
     <p:extLst>
       <p:ext uri="{BB962C8B-B14F-4D97-AF65-F5344CB8AC3E}">
-        <p14:creationId xmlns:p14="http://schemas.microsoft.com/office/powerpoint/2010/main" val="1011769305"/>
+        <p14:creationId xmlns:p14="http://schemas.microsoft.com/office/powerpoint/2010/main" val="1375091842"/>
       </p:ext>
     </p:extLst>
   </p:cSld>
@@ -938,7 +1320,7 @@
           <p:cNvPr id="2" name="Title 1" hidden="1">
             <a:extLst>
               <a:ext uri="{FF2B5EF4-FFF2-40B4-BE49-F238E27FC236}">
-                <a16:creationId xmlns:a16="http://schemas.microsoft.com/office/drawing/2014/main" id="{09827C19-2CD0-4362-ADB5-45BD55A56643}"/>
+                <a16:creationId xmlns:a16="http://schemas.microsoft.com/office/drawing/2014/main" id="{C16204F3-B8C1-4342-9588-83EC05135EC7}"/>
               </a:ext>
             </a:extLst>
           </p:cNvPr>
@@ -963,7 +1345,7 @@
           <p:cNvPr id="3" name="Picture 2">
             <a:extLst>
               <a:ext uri="{FF2B5EF4-FFF2-40B4-BE49-F238E27FC236}">
-                <a16:creationId xmlns:a16="http://schemas.microsoft.com/office/drawing/2014/main" id="{6F44769A-1F25-4878-9903-F7CEDAE18036}"/>
+                <a16:creationId xmlns:a16="http://schemas.microsoft.com/office/drawing/2014/main" id="{E1DE01F0-2708-4386-A42F-4B6CAE1C373F}"/>
               </a:ext>
             </a:extLst>
           </p:cNvPr>
@@ -986,10 +1368,39 @@
           </a:prstGeom>
         </p:spPr>
       </p:pic>
+      <p:sp>
+        <p:nvSpPr>
+          <p:cNvPr id="4" name="Slide Number Placeholder 3">
+            <a:extLst>
+              <a:ext uri="{FF2B5EF4-FFF2-40B4-BE49-F238E27FC236}">
+                <a16:creationId xmlns:a16="http://schemas.microsoft.com/office/drawing/2014/main" id="{A9B4DE07-5CC0-45BA-BD64-0473D3F2DA08}"/>
+              </a:ext>
+            </a:extLst>
+          </p:cNvPr>
+          <p:cNvSpPr>
+            <a:spLocks noGrp="1"/>
+          </p:cNvSpPr>
+          <p:nvPr>
+            <p:ph type="sldNum" sz="quarter" idx="12"/>
+          </p:nvPr>
+        </p:nvSpPr>
+        <p:spPr/>
+        <p:txBody>
+          <a:bodyPr/>
+          <a:lstStyle/>
+          <a:p>
+            <a:fld id="{48EAAD28-6291-48B7-87C0-79E56BC93411}" type="slidenum">
+              <a:rPr lang="en-US" smtClean="0"/>
+              <a:t>10</a:t>
+            </a:fld>
+            <a:endParaRPr lang="en-US"/>
+          </a:p>
+        </p:txBody>
+      </p:sp>
     </p:spTree>
     <p:extLst>
       <p:ext uri="{BB962C8B-B14F-4D97-AF65-F5344CB8AC3E}">
-        <p14:creationId xmlns:p14="http://schemas.microsoft.com/office/powerpoint/2010/main" val="2569887553"/>
+        <p14:creationId xmlns:p14="http://schemas.microsoft.com/office/powerpoint/2010/main" val="3547887645"/>
       </p:ext>
     </p:extLst>
   </p:cSld>
@@ -1027,7 +1438,7 @@
           <p:cNvPr id="2" name="Title 1" hidden="1">
             <a:extLst>
               <a:ext uri="{FF2B5EF4-FFF2-40B4-BE49-F238E27FC236}">
-                <a16:creationId xmlns:a16="http://schemas.microsoft.com/office/drawing/2014/main" id="{850167C3-889F-4774-AFF6-409799797C30}"/>
+                <a16:creationId xmlns:a16="http://schemas.microsoft.com/office/drawing/2014/main" id="{A66E4313-7A42-41B3-870B-9375D3DAF8DD}"/>
               </a:ext>
             </a:extLst>
           </p:cNvPr>
@@ -1052,7 +1463,7 @@
           <p:cNvPr id="3" name="Picture 2">
             <a:extLst>
               <a:ext uri="{FF2B5EF4-FFF2-40B4-BE49-F238E27FC236}">
-                <a16:creationId xmlns:a16="http://schemas.microsoft.com/office/drawing/2014/main" id="{C36A5396-D0E8-49F6-BFF2-AA7FF1AF46F0}"/>
+                <a16:creationId xmlns:a16="http://schemas.microsoft.com/office/drawing/2014/main" id="{1D841981-5362-4612-9AA9-0525A8D46EBB}"/>
               </a:ext>
             </a:extLst>
           </p:cNvPr>
@@ -1075,10 +1486,39 @@
           </a:prstGeom>
         </p:spPr>
       </p:pic>
+      <p:sp>
+        <p:nvSpPr>
+          <p:cNvPr id="4" name="Slide Number Placeholder 3">
+            <a:extLst>
+              <a:ext uri="{FF2B5EF4-FFF2-40B4-BE49-F238E27FC236}">
+                <a16:creationId xmlns:a16="http://schemas.microsoft.com/office/drawing/2014/main" id="{3AEA9887-9479-4540-AA64-B524F9438DB9}"/>
+              </a:ext>
+            </a:extLst>
+          </p:cNvPr>
+          <p:cNvSpPr>
+            <a:spLocks noGrp="1"/>
+          </p:cNvSpPr>
+          <p:nvPr>
+            <p:ph type="sldNum" sz="quarter" idx="12"/>
+          </p:nvPr>
+        </p:nvSpPr>
+        <p:spPr/>
+        <p:txBody>
+          <a:bodyPr/>
+          <a:lstStyle/>
+          <a:p>
+            <a:fld id="{48EAAD28-6291-48B7-87C0-79E56BC93411}" type="slidenum">
+              <a:rPr lang="en-US" smtClean="0"/>
+              <a:t>11</a:t>
+            </a:fld>
+            <a:endParaRPr lang="en-US"/>
+          </a:p>
+        </p:txBody>
+      </p:sp>
     </p:spTree>
     <p:extLst>
       <p:ext uri="{BB962C8B-B14F-4D97-AF65-F5344CB8AC3E}">
-        <p14:creationId xmlns:p14="http://schemas.microsoft.com/office/powerpoint/2010/main" val="1239349376"/>
+        <p14:creationId xmlns:p14="http://schemas.microsoft.com/office/powerpoint/2010/main" val="3236954091"/>
       </p:ext>
     </p:extLst>
   </p:cSld>
@@ -1116,7 +1556,7 @@
           <p:cNvPr id="2" name="Title 1" hidden="1">
             <a:extLst>
               <a:ext uri="{FF2B5EF4-FFF2-40B4-BE49-F238E27FC236}">
-                <a16:creationId xmlns:a16="http://schemas.microsoft.com/office/drawing/2014/main" id="{590E5BD9-64FD-490F-9D95-718427A0B76D}"/>
+                <a16:creationId xmlns:a16="http://schemas.microsoft.com/office/drawing/2014/main" id="{32D1C154-EA95-45A2-BC0B-B0DCB2DB2E33}"/>
               </a:ext>
             </a:extLst>
           </p:cNvPr>
@@ -1141,7 +1581,7 @@
           <p:cNvPr id="3" name="Picture 2">
             <a:extLst>
               <a:ext uri="{FF2B5EF4-FFF2-40B4-BE49-F238E27FC236}">
-                <a16:creationId xmlns:a16="http://schemas.microsoft.com/office/drawing/2014/main" id="{B2C6CF5B-519C-4E84-B4BD-7C3B051B26EC}"/>
+                <a16:creationId xmlns:a16="http://schemas.microsoft.com/office/drawing/2014/main" id="{C1FBD346-476D-430F-BAC1-7CAEE382C728}"/>
               </a:ext>
             </a:extLst>
           </p:cNvPr>
@@ -1164,10 +1604,39 @@
           </a:prstGeom>
         </p:spPr>
       </p:pic>
+      <p:sp>
+        <p:nvSpPr>
+          <p:cNvPr id="4" name="Slide Number Placeholder 3">
+            <a:extLst>
+              <a:ext uri="{FF2B5EF4-FFF2-40B4-BE49-F238E27FC236}">
+                <a16:creationId xmlns:a16="http://schemas.microsoft.com/office/drawing/2014/main" id="{CAA7C40B-5432-408B-BD49-F4E841008623}"/>
+              </a:ext>
+            </a:extLst>
+          </p:cNvPr>
+          <p:cNvSpPr>
+            <a:spLocks noGrp="1"/>
+          </p:cNvSpPr>
+          <p:nvPr>
+            <p:ph type="sldNum" sz="quarter" idx="12"/>
+          </p:nvPr>
+        </p:nvSpPr>
+        <p:spPr/>
+        <p:txBody>
+          <a:bodyPr/>
+          <a:lstStyle/>
+          <a:p>
+            <a:fld id="{48EAAD28-6291-48B7-87C0-79E56BC93411}" type="slidenum">
+              <a:rPr lang="en-US" smtClean="0"/>
+              <a:t>12</a:t>
+            </a:fld>
+            <a:endParaRPr lang="en-US"/>
+          </a:p>
+        </p:txBody>
+      </p:sp>
     </p:spTree>
     <p:extLst>
       <p:ext uri="{BB962C8B-B14F-4D97-AF65-F5344CB8AC3E}">
-        <p14:creationId xmlns:p14="http://schemas.microsoft.com/office/powerpoint/2010/main" val="1968509181"/>
+        <p14:creationId xmlns:p14="http://schemas.microsoft.com/office/powerpoint/2010/main" val="3294020112"/>
       </p:ext>
     </p:extLst>
   </p:cSld>
@@ -1205,7 +1674,7 @@
           <p:cNvPr id="2" name="Title 1" hidden="1">
             <a:extLst>
               <a:ext uri="{FF2B5EF4-FFF2-40B4-BE49-F238E27FC236}">
-                <a16:creationId xmlns:a16="http://schemas.microsoft.com/office/drawing/2014/main" id="{160E5D3E-A557-42E9-BC02-B9F861AB5744}"/>
+                <a16:creationId xmlns:a16="http://schemas.microsoft.com/office/drawing/2014/main" id="{38473F32-0566-4E61-92E4-5EC8E813B6CF}"/>
               </a:ext>
             </a:extLst>
           </p:cNvPr>
@@ -1230,7 +1699,7 @@
           <p:cNvPr id="3" name="Picture 2">
             <a:extLst>
               <a:ext uri="{FF2B5EF4-FFF2-40B4-BE49-F238E27FC236}">
-                <a16:creationId xmlns:a16="http://schemas.microsoft.com/office/drawing/2014/main" id="{5A63220C-40BE-424F-88C5-1AC41FCBA16A}"/>
+                <a16:creationId xmlns:a16="http://schemas.microsoft.com/office/drawing/2014/main" id="{A56CB6BA-EEA9-46F5-BD9B-EA605C042653}"/>
               </a:ext>
             </a:extLst>
           </p:cNvPr>
@@ -1253,10 +1722,39 @@
           </a:prstGeom>
         </p:spPr>
       </p:pic>
+      <p:sp>
+        <p:nvSpPr>
+          <p:cNvPr id="4" name="Slide Number Placeholder 3">
+            <a:extLst>
+              <a:ext uri="{FF2B5EF4-FFF2-40B4-BE49-F238E27FC236}">
+                <a16:creationId xmlns:a16="http://schemas.microsoft.com/office/drawing/2014/main" id="{948FB90F-7D91-483D-BC05-B96A70E4FE72}"/>
+              </a:ext>
+            </a:extLst>
+          </p:cNvPr>
+          <p:cNvSpPr>
+            <a:spLocks noGrp="1"/>
+          </p:cNvSpPr>
+          <p:nvPr>
+            <p:ph type="sldNum" sz="quarter" idx="12"/>
+          </p:nvPr>
+        </p:nvSpPr>
+        <p:spPr/>
+        <p:txBody>
+          <a:bodyPr/>
+          <a:lstStyle/>
+          <a:p>
+            <a:fld id="{48EAAD28-6291-48B7-87C0-79E56BC93411}" type="slidenum">
+              <a:rPr lang="en-US" smtClean="0"/>
+              <a:t>13</a:t>
+            </a:fld>
+            <a:endParaRPr lang="en-US"/>
+          </a:p>
+        </p:txBody>
+      </p:sp>
     </p:spTree>
     <p:extLst>
       <p:ext uri="{BB962C8B-B14F-4D97-AF65-F5344CB8AC3E}">
-        <p14:creationId xmlns:p14="http://schemas.microsoft.com/office/powerpoint/2010/main" val="1968988714"/>
+        <p14:creationId xmlns:p14="http://schemas.microsoft.com/office/powerpoint/2010/main" val="3006315663"/>
       </p:ext>
     </p:extLst>
   </p:cSld>
@@ -1294,7 +1792,7 @@
           <p:cNvPr id="2" name="Title 1" hidden="1">
             <a:extLst>
               <a:ext uri="{FF2B5EF4-FFF2-40B4-BE49-F238E27FC236}">
-                <a16:creationId xmlns:a16="http://schemas.microsoft.com/office/drawing/2014/main" id="{8140A9D9-612B-4F17-8FFF-A6DC8E4DF2EB}"/>
+                <a16:creationId xmlns:a16="http://schemas.microsoft.com/office/drawing/2014/main" id="{C69B3D3C-AF71-4B8E-9607-FF799E021EAB}"/>
               </a:ext>
             </a:extLst>
           </p:cNvPr>
@@ -1319,7 +1817,7 @@
           <p:cNvPr id="3" name="Picture 2">
             <a:extLst>
               <a:ext uri="{FF2B5EF4-FFF2-40B4-BE49-F238E27FC236}">
-                <a16:creationId xmlns:a16="http://schemas.microsoft.com/office/drawing/2014/main" id="{F446504D-0A14-4725-8379-084D7BA04A6D}"/>
+                <a16:creationId xmlns:a16="http://schemas.microsoft.com/office/drawing/2014/main" id="{360B5D7D-6C55-4AC4-A9C3-0FD7E2D8B714}"/>
               </a:ext>
             </a:extLst>
           </p:cNvPr>
@@ -1342,10 +1840,39 @@
           </a:prstGeom>
         </p:spPr>
       </p:pic>
+      <p:sp>
+        <p:nvSpPr>
+          <p:cNvPr id="4" name="Slide Number Placeholder 3">
+            <a:extLst>
+              <a:ext uri="{FF2B5EF4-FFF2-40B4-BE49-F238E27FC236}">
+                <a16:creationId xmlns:a16="http://schemas.microsoft.com/office/drawing/2014/main" id="{4C375FD1-8BFB-4F68-B03D-E4C5E43A3041}"/>
+              </a:ext>
+            </a:extLst>
+          </p:cNvPr>
+          <p:cNvSpPr>
+            <a:spLocks noGrp="1"/>
+          </p:cNvSpPr>
+          <p:nvPr>
+            <p:ph type="sldNum" sz="quarter" idx="12"/>
+          </p:nvPr>
+        </p:nvSpPr>
+        <p:spPr/>
+        <p:txBody>
+          <a:bodyPr/>
+          <a:lstStyle/>
+          <a:p>
+            <a:fld id="{48EAAD28-6291-48B7-87C0-79E56BC93411}" type="slidenum">
+              <a:rPr lang="en-US" smtClean="0"/>
+              <a:t>14</a:t>
+            </a:fld>
+            <a:endParaRPr lang="en-US"/>
+          </a:p>
+        </p:txBody>
+      </p:sp>
     </p:spTree>
     <p:extLst>
       <p:ext uri="{BB962C8B-B14F-4D97-AF65-F5344CB8AC3E}">
-        <p14:creationId xmlns:p14="http://schemas.microsoft.com/office/powerpoint/2010/main" val="3594677847"/>
+        <p14:creationId xmlns:p14="http://schemas.microsoft.com/office/powerpoint/2010/main" val="858860142"/>
       </p:ext>
     </p:extLst>
   </p:cSld>
@@ -1383,7 +1910,7 @@
           <p:cNvPr id="2" name="Title 1" hidden="1">
             <a:extLst>
               <a:ext uri="{FF2B5EF4-FFF2-40B4-BE49-F238E27FC236}">
-                <a16:creationId xmlns:a16="http://schemas.microsoft.com/office/drawing/2014/main" id="{7A8AB4C3-C05D-452F-897D-63E9E6BCA936}"/>
+                <a16:creationId xmlns:a16="http://schemas.microsoft.com/office/drawing/2014/main" id="{D6734549-899A-4AA0-A429-AAEAE8799A34}"/>
               </a:ext>
             </a:extLst>
           </p:cNvPr>
@@ -1408,7 +1935,7 @@
           <p:cNvPr id="3" name="Picture 2">
             <a:extLst>
               <a:ext uri="{FF2B5EF4-FFF2-40B4-BE49-F238E27FC236}">
-                <a16:creationId xmlns:a16="http://schemas.microsoft.com/office/drawing/2014/main" id="{0C4ECDA0-CBAE-460F-BF7E-7E8B2C5D0116}"/>
+                <a16:creationId xmlns:a16="http://schemas.microsoft.com/office/drawing/2014/main" id="{CB387B7C-6650-44B6-932A-E1F6E7D1B7B2}"/>
               </a:ext>
             </a:extLst>
           </p:cNvPr>
@@ -1431,10 +1958,39 @@
           </a:prstGeom>
         </p:spPr>
       </p:pic>
+      <p:sp>
+        <p:nvSpPr>
+          <p:cNvPr id="4" name="Slide Number Placeholder 3">
+            <a:extLst>
+              <a:ext uri="{FF2B5EF4-FFF2-40B4-BE49-F238E27FC236}">
+                <a16:creationId xmlns:a16="http://schemas.microsoft.com/office/drawing/2014/main" id="{FC5CD1D6-1176-489D-B878-1F4CC38AF1E7}"/>
+              </a:ext>
+            </a:extLst>
+          </p:cNvPr>
+          <p:cNvSpPr>
+            <a:spLocks noGrp="1"/>
+          </p:cNvSpPr>
+          <p:nvPr>
+            <p:ph type="sldNum" sz="quarter" idx="12"/>
+          </p:nvPr>
+        </p:nvSpPr>
+        <p:spPr/>
+        <p:txBody>
+          <a:bodyPr/>
+          <a:lstStyle/>
+          <a:p>
+            <a:fld id="{48EAAD28-6291-48B7-87C0-79E56BC93411}" type="slidenum">
+              <a:rPr lang="en-US" smtClean="0"/>
+              <a:t>15</a:t>
+            </a:fld>
+            <a:endParaRPr lang="en-US"/>
+          </a:p>
+        </p:txBody>
+      </p:sp>
     </p:spTree>
     <p:extLst>
       <p:ext uri="{BB962C8B-B14F-4D97-AF65-F5344CB8AC3E}">
-        <p14:creationId xmlns:p14="http://schemas.microsoft.com/office/powerpoint/2010/main" val="1030201857"/>
+        <p14:creationId xmlns:p14="http://schemas.microsoft.com/office/powerpoint/2010/main" val="641974211"/>
       </p:ext>
     </p:extLst>
   </p:cSld>
@@ -1472,7 +2028,7 @@
           <p:cNvPr id="2" name="Title 1" hidden="1">
             <a:extLst>
               <a:ext uri="{FF2B5EF4-FFF2-40B4-BE49-F238E27FC236}">
-                <a16:creationId xmlns:a16="http://schemas.microsoft.com/office/drawing/2014/main" id="{8E6024B5-1BB9-4843-A5CC-429B4B96EA23}"/>
+                <a16:creationId xmlns:a16="http://schemas.microsoft.com/office/drawing/2014/main" id="{932786CA-A795-4BE8-ABC4-16D91EBF6E4B}"/>
               </a:ext>
             </a:extLst>
           </p:cNvPr>
@@ -1497,7 +2053,7 @@
           <p:cNvPr id="3" name="Picture 2">
             <a:extLst>
               <a:ext uri="{FF2B5EF4-FFF2-40B4-BE49-F238E27FC236}">
-                <a16:creationId xmlns:a16="http://schemas.microsoft.com/office/drawing/2014/main" id="{0039BCA6-0303-442A-9F98-B9A9B3D45940}"/>
+                <a16:creationId xmlns:a16="http://schemas.microsoft.com/office/drawing/2014/main" id="{48D7AB3D-57BA-4F05-8E5B-6FBCF8B0700D}"/>
               </a:ext>
             </a:extLst>
           </p:cNvPr>
@@ -1520,10 +2076,39 @@
           </a:prstGeom>
         </p:spPr>
       </p:pic>
+      <p:sp>
+        <p:nvSpPr>
+          <p:cNvPr id="4" name="Slide Number Placeholder 3">
+            <a:extLst>
+              <a:ext uri="{FF2B5EF4-FFF2-40B4-BE49-F238E27FC236}">
+                <a16:creationId xmlns:a16="http://schemas.microsoft.com/office/drawing/2014/main" id="{8BC686C9-561F-4617-AADA-98F82893AB31}"/>
+              </a:ext>
+            </a:extLst>
+          </p:cNvPr>
+          <p:cNvSpPr>
+            <a:spLocks noGrp="1"/>
+          </p:cNvSpPr>
+          <p:nvPr>
+            <p:ph type="sldNum" sz="quarter" idx="12"/>
+          </p:nvPr>
+        </p:nvSpPr>
+        <p:spPr/>
+        <p:txBody>
+          <a:bodyPr/>
+          <a:lstStyle/>
+          <a:p>
+            <a:fld id="{48EAAD28-6291-48B7-87C0-79E56BC93411}" type="slidenum">
+              <a:rPr lang="en-US" smtClean="0"/>
+              <a:t>16</a:t>
+            </a:fld>
+            <a:endParaRPr lang="en-US"/>
+          </a:p>
+        </p:txBody>
+      </p:sp>
     </p:spTree>
     <p:extLst>
       <p:ext uri="{BB962C8B-B14F-4D97-AF65-F5344CB8AC3E}">
-        <p14:creationId xmlns:p14="http://schemas.microsoft.com/office/powerpoint/2010/main" val="1278114149"/>
+        <p14:creationId xmlns:p14="http://schemas.microsoft.com/office/powerpoint/2010/main" val="2373792714"/>
       </p:ext>
     </p:extLst>
   </p:cSld>
@@ -1561,7 +2146,7 @@
           <p:cNvPr id="2" name="Title 1" hidden="1">
             <a:extLst>
               <a:ext uri="{FF2B5EF4-FFF2-40B4-BE49-F238E27FC236}">
-                <a16:creationId xmlns:a16="http://schemas.microsoft.com/office/drawing/2014/main" id="{7AEBBB12-75E6-45EC-8812-B9C6457E7792}"/>
+                <a16:creationId xmlns:a16="http://schemas.microsoft.com/office/drawing/2014/main" id="{1DF75D30-C011-4351-B0FC-5903C08444F1}"/>
               </a:ext>
             </a:extLst>
           </p:cNvPr>
@@ -1586,7 +2171,7 @@
           <p:cNvPr id="3" name="Picture 2">
             <a:extLst>
               <a:ext uri="{FF2B5EF4-FFF2-40B4-BE49-F238E27FC236}">
-                <a16:creationId xmlns:a16="http://schemas.microsoft.com/office/drawing/2014/main" id="{0017E3D4-5031-48D9-9878-B6E058D81F98}"/>
+                <a16:creationId xmlns:a16="http://schemas.microsoft.com/office/drawing/2014/main" id="{F3E84B0A-9255-4561-9B97-D85DC056265D}"/>
               </a:ext>
             </a:extLst>
           </p:cNvPr>
@@ -1609,10 +2194,39 @@
           </a:prstGeom>
         </p:spPr>
       </p:pic>
+      <p:sp>
+        <p:nvSpPr>
+          <p:cNvPr id="4" name="Slide Number Placeholder 3">
+            <a:extLst>
+              <a:ext uri="{FF2B5EF4-FFF2-40B4-BE49-F238E27FC236}">
+                <a16:creationId xmlns:a16="http://schemas.microsoft.com/office/drawing/2014/main" id="{70D4337B-10A9-4BC3-AD93-E707552EAE70}"/>
+              </a:ext>
+            </a:extLst>
+          </p:cNvPr>
+          <p:cNvSpPr>
+            <a:spLocks noGrp="1"/>
+          </p:cNvSpPr>
+          <p:nvPr>
+            <p:ph type="sldNum" sz="quarter" idx="12"/>
+          </p:nvPr>
+        </p:nvSpPr>
+        <p:spPr/>
+        <p:txBody>
+          <a:bodyPr/>
+          <a:lstStyle/>
+          <a:p>
+            <a:fld id="{48EAAD28-6291-48B7-87C0-79E56BC93411}" type="slidenum">
+              <a:rPr lang="en-US" smtClean="0"/>
+              <a:t>2</a:t>
+            </a:fld>
+            <a:endParaRPr lang="en-US"/>
+          </a:p>
+        </p:txBody>
+      </p:sp>
     </p:spTree>
     <p:extLst>
       <p:ext uri="{BB962C8B-B14F-4D97-AF65-F5344CB8AC3E}">
-        <p14:creationId xmlns:p14="http://schemas.microsoft.com/office/powerpoint/2010/main" val="538130201"/>
+        <p14:creationId xmlns:p14="http://schemas.microsoft.com/office/powerpoint/2010/main" val="327417591"/>
       </p:ext>
     </p:extLst>
   </p:cSld>
@@ -1650,7 +2264,7 @@
           <p:cNvPr id="2" name="Title 1" hidden="1">
             <a:extLst>
               <a:ext uri="{FF2B5EF4-FFF2-40B4-BE49-F238E27FC236}">
-                <a16:creationId xmlns:a16="http://schemas.microsoft.com/office/drawing/2014/main" id="{5A03C349-C0A9-431B-8EE5-158E38C121B6}"/>
+                <a16:creationId xmlns:a16="http://schemas.microsoft.com/office/drawing/2014/main" id="{0192EFCC-13C9-4527-83D1-ECC43D6CF0AE}"/>
               </a:ext>
             </a:extLst>
           </p:cNvPr>
@@ -1675,7 +2289,7 @@
           <p:cNvPr id="3" name="Picture 2">
             <a:extLst>
               <a:ext uri="{FF2B5EF4-FFF2-40B4-BE49-F238E27FC236}">
-                <a16:creationId xmlns:a16="http://schemas.microsoft.com/office/drawing/2014/main" id="{03C7BD74-ED40-461E-BC29-43145311B890}"/>
+                <a16:creationId xmlns:a16="http://schemas.microsoft.com/office/drawing/2014/main" id="{F11B1E85-1088-449E-AB30-7C7F9FA13153}"/>
               </a:ext>
             </a:extLst>
           </p:cNvPr>
@@ -1698,10 +2312,39 @@
           </a:prstGeom>
         </p:spPr>
       </p:pic>
+      <p:sp>
+        <p:nvSpPr>
+          <p:cNvPr id="4" name="Slide Number Placeholder 3">
+            <a:extLst>
+              <a:ext uri="{FF2B5EF4-FFF2-40B4-BE49-F238E27FC236}">
+                <a16:creationId xmlns:a16="http://schemas.microsoft.com/office/drawing/2014/main" id="{9BBF20DE-7856-42FD-83E7-61969B4D05D2}"/>
+              </a:ext>
+            </a:extLst>
+          </p:cNvPr>
+          <p:cNvSpPr>
+            <a:spLocks noGrp="1"/>
+          </p:cNvSpPr>
+          <p:nvPr>
+            <p:ph type="sldNum" sz="quarter" idx="12"/>
+          </p:nvPr>
+        </p:nvSpPr>
+        <p:spPr/>
+        <p:txBody>
+          <a:bodyPr/>
+          <a:lstStyle/>
+          <a:p>
+            <a:fld id="{48EAAD28-6291-48B7-87C0-79E56BC93411}" type="slidenum">
+              <a:rPr lang="en-US" smtClean="0"/>
+              <a:t>3</a:t>
+            </a:fld>
+            <a:endParaRPr lang="en-US"/>
+          </a:p>
+        </p:txBody>
+      </p:sp>
     </p:spTree>
     <p:extLst>
       <p:ext uri="{BB962C8B-B14F-4D97-AF65-F5344CB8AC3E}">
-        <p14:creationId xmlns:p14="http://schemas.microsoft.com/office/powerpoint/2010/main" val="3717882298"/>
+        <p14:creationId xmlns:p14="http://schemas.microsoft.com/office/powerpoint/2010/main" val="1838336996"/>
       </p:ext>
     </p:extLst>
   </p:cSld>
@@ -1739,7 +2382,7 @@
           <p:cNvPr id="2" name="Title 1" hidden="1">
             <a:extLst>
               <a:ext uri="{FF2B5EF4-FFF2-40B4-BE49-F238E27FC236}">
-                <a16:creationId xmlns:a16="http://schemas.microsoft.com/office/drawing/2014/main" id="{DD1FC4F2-F26E-4150-B0C6-D87BE68B4D5A}"/>
+                <a16:creationId xmlns:a16="http://schemas.microsoft.com/office/drawing/2014/main" id="{9871074D-2A74-4DD3-A3F4-F8FE4662E399}"/>
               </a:ext>
             </a:extLst>
           </p:cNvPr>
@@ -1764,7 +2407,7 @@
           <p:cNvPr id="3" name="Picture 2">
             <a:extLst>
               <a:ext uri="{FF2B5EF4-FFF2-40B4-BE49-F238E27FC236}">
-                <a16:creationId xmlns:a16="http://schemas.microsoft.com/office/drawing/2014/main" id="{D7B54CB0-0100-4F91-8CD8-7132B8377D6A}"/>
+                <a16:creationId xmlns:a16="http://schemas.microsoft.com/office/drawing/2014/main" id="{AE6D9396-6806-44DF-9630-D37D8409E740}"/>
               </a:ext>
             </a:extLst>
           </p:cNvPr>
@@ -1787,10 +2430,39 @@
           </a:prstGeom>
         </p:spPr>
       </p:pic>
+      <p:sp>
+        <p:nvSpPr>
+          <p:cNvPr id="4" name="Slide Number Placeholder 3">
+            <a:extLst>
+              <a:ext uri="{FF2B5EF4-FFF2-40B4-BE49-F238E27FC236}">
+                <a16:creationId xmlns:a16="http://schemas.microsoft.com/office/drawing/2014/main" id="{5D2CB66B-6642-4049-8353-927E270CDF99}"/>
+              </a:ext>
+            </a:extLst>
+          </p:cNvPr>
+          <p:cNvSpPr>
+            <a:spLocks noGrp="1"/>
+          </p:cNvSpPr>
+          <p:nvPr>
+            <p:ph type="sldNum" sz="quarter" idx="12"/>
+          </p:nvPr>
+        </p:nvSpPr>
+        <p:spPr/>
+        <p:txBody>
+          <a:bodyPr/>
+          <a:lstStyle/>
+          <a:p>
+            <a:fld id="{48EAAD28-6291-48B7-87C0-79E56BC93411}" type="slidenum">
+              <a:rPr lang="en-US" smtClean="0"/>
+              <a:t>4</a:t>
+            </a:fld>
+            <a:endParaRPr lang="en-US"/>
+          </a:p>
+        </p:txBody>
+      </p:sp>
     </p:spTree>
     <p:extLst>
       <p:ext uri="{BB962C8B-B14F-4D97-AF65-F5344CB8AC3E}">
-        <p14:creationId xmlns:p14="http://schemas.microsoft.com/office/powerpoint/2010/main" val="1512368420"/>
+        <p14:creationId xmlns:p14="http://schemas.microsoft.com/office/powerpoint/2010/main" val="1052032541"/>
       </p:ext>
     </p:extLst>
   </p:cSld>
@@ -1828,7 +2500,7 @@
           <p:cNvPr id="2" name="Title 1" hidden="1">
             <a:extLst>
               <a:ext uri="{FF2B5EF4-FFF2-40B4-BE49-F238E27FC236}">
-                <a16:creationId xmlns:a16="http://schemas.microsoft.com/office/drawing/2014/main" id="{45FB6387-6075-4D62-8332-6064AF5AD16F}"/>
+                <a16:creationId xmlns:a16="http://schemas.microsoft.com/office/drawing/2014/main" id="{8493037A-CA8F-4AFD-B214-258840AE9FBA}"/>
               </a:ext>
             </a:extLst>
           </p:cNvPr>
@@ -1853,7 +2525,7 @@
           <p:cNvPr id="3" name="Picture 2">
             <a:extLst>
               <a:ext uri="{FF2B5EF4-FFF2-40B4-BE49-F238E27FC236}">
-                <a16:creationId xmlns:a16="http://schemas.microsoft.com/office/drawing/2014/main" id="{F0EC59ED-FCC5-48C2-B6F9-D42D3E3FF178}"/>
+                <a16:creationId xmlns:a16="http://schemas.microsoft.com/office/drawing/2014/main" id="{FF3C6ED4-6430-4838-9B44-979F648B9657}"/>
               </a:ext>
             </a:extLst>
           </p:cNvPr>
@@ -1876,10 +2548,39 @@
           </a:prstGeom>
         </p:spPr>
       </p:pic>
+      <p:sp>
+        <p:nvSpPr>
+          <p:cNvPr id="4" name="Slide Number Placeholder 3">
+            <a:extLst>
+              <a:ext uri="{FF2B5EF4-FFF2-40B4-BE49-F238E27FC236}">
+                <a16:creationId xmlns:a16="http://schemas.microsoft.com/office/drawing/2014/main" id="{105B591B-67D4-4A18-A556-5D2F0C1849D2}"/>
+              </a:ext>
+            </a:extLst>
+          </p:cNvPr>
+          <p:cNvSpPr>
+            <a:spLocks noGrp="1"/>
+          </p:cNvSpPr>
+          <p:nvPr>
+            <p:ph type="sldNum" sz="quarter" idx="12"/>
+          </p:nvPr>
+        </p:nvSpPr>
+        <p:spPr/>
+        <p:txBody>
+          <a:bodyPr/>
+          <a:lstStyle/>
+          <a:p>
+            <a:fld id="{48EAAD28-6291-48B7-87C0-79E56BC93411}" type="slidenum">
+              <a:rPr lang="en-US" smtClean="0"/>
+              <a:t>5</a:t>
+            </a:fld>
+            <a:endParaRPr lang="en-US"/>
+          </a:p>
+        </p:txBody>
+      </p:sp>
     </p:spTree>
     <p:extLst>
       <p:ext uri="{BB962C8B-B14F-4D97-AF65-F5344CB8AC3E}">
-        <p14:creationId xmlns:p14="http://schemas.microsoft.com/office/powerpoint/2010/main" val="3018688946"/>
+        <p14:creationId xmlns:p14="http://schemas.microsoft.com/office/powerpoint/2010/main" val="3286190757"/>
       </p:ext>
     </p:extLst>
   </p:cSld>
@@ -1917,7 +2618,7 @@
           <p:cNvPr id="2" name="Title 1" hidden="1">
             <a:extLst>
               <a:ext uri="{FF2B5EF4-FFF2-40B4-BE49-F238E27FC236}">
-                <a16:creationId xmlns:a16="http://schemas.microsoft.com/office/drawing/2014/main" id="{21818E8B-32EC-4738-872A-9BE121433584}"/>
+                <a16:creationId xmlns:a16="http://schemas.microsoft.com/office/drawing/2014/main" id="{C13086B5-FA50-43A8-BFFF-BFE64E3FB422}"/>
               </a:ext>
             </a:extLst>
           </p:cNvPr>
@@ -1942,7 +2643,7 @@
           <p:cNvPr id="3" name="Picture 2">
             <a:extLst>
               <a:ext uri="{FF2B5EF4-FFF2-40B4-BE49-F238E27FC236}">
-                <a16:creationId xmlns:a16="http://schemas.microsoft.com/office/drawing/2014/main" id="{F2213C74-663D-4463-B8CB-45AE43B91347}"/>
+                <a16:creationId xmlns:a16="http://schemas.microsoft.com/office/drawing/2014/main" id="{7E5AC1DA-C961-4B0D-B242-C3BDC3F5E87C}"/>
               </a:ext>
             </a:extLst>
           </p:cNvPr>
@@ -1965,10 +2666,39 @@
           </a:prstGeom>
         </p:spPr>
       </p:pic>
+      <p:sp>
+        <p:nvSpPr>
+          <p:cNvPr id="4" name="Slide Number Placeholder 3">
+            <a:extLst>
+              <a:ext uri="{FF2B5EF4-FFF2-40B4-BE49-F238E27FC236}">
+                <a16:creationId xmlns:a16="http://schemas.microsoft.com/office/drawing/2014/main" id="{30DA5CBC-A108-4B52-BE7E-269D6EEE6B6B}"/>
+              </a:ext>
+            </a:extLst>
+          </p:cNvPr>
+          <p:cNvSpPr>
+            <a:spLocks noGrp="1"/>
+          </p:cNvSpPr>
+          <p:nvPr>
+            <p:ph type="sldNum" sz="quarter" idx="12"/>
+          </p:nvPr>
+        </p:nvSpPr>
+        <p:spPr/>
+        <p:txBody>
+          <a:bodyPr/>
+          <a:lstStyle/>
+          <a:p>
+            <a:fld id="{48EAAD28-6291-48B7-87C0-79E56BC93411}" type="slidenum">
+              <a:rPr lang="en-US" smtClean="0"/>
+              <a:t>6</a:t>
+            </a:fld>
+            <a:endParaRPr lang="en-US"/>
+          </a:p>
+        </p:txBody>
+      </p:sp>
     </p:spTree>
     <p:extLst>
       <p:ext uri="{BB962C8B-B14F-4D97-AF65-F5344CB8AC3E}">
-        <p14:creationId xmlns:p14="http://schemas.microsoft.com/office/powerpoint/2010/main" val="3347400502"/>
+        <p14:creationId xmlns:p14="http://schemas.microsoft.com/office/powerpoint/2010/main" val="2107534547"/>
       </p:ext>
     </p:extLst>
   </p:cSld>
@@ -2006,7 +2736,7 @@
           <p:cNvPr id="2" name="Title 1" hidden="1">
             <a:extLst>
               <a:ext uri="{FF2B5EF4-FFF2-40B4-BE49-F238E27FC236}">
-                <a16:creationId xmlns:a16="http://schemas.microsoft.com/office/drawing/2014/main" id="{F88C1558-206E-4BA1-B92F-052D1F4F7AE6}"/>
+                <a16:creationId xmlns:a16="http://schemas.microsoft.com/office/drawing/2014/main" id="{158407D5-5ACE-4B83-A60D-D1343C6D924C}"/>
               </a:ext>
             </a:extLst>
           </p:cNvPr>
@@ -2031,7 +2761,7 @@
           <p:cNvPr id="3" name="Picture 2">
             <a:extLst>
               <a:ext uri="{FF2B5EF4-FFF2-40B4-BE49-F238E27FC236}">
-                <a16:creationId xmlns:a16="http://schemas.microsoft.com/office/drawing/2014/main" id="{1BC6C56B-A384-4F32-98FB-59001F4BFC03}"/>
+                <a16:creationId xmlns:a16="http://schemas.microsoft.com/office/drawing/2014/main" id="{3CDD1B48-6316-43FB-BC80-0D6DCF492FD5}"/>
               </a:ext>
             </a:extLst>
           </p:cNvPr>
@@ -2054,10 +2784,39 @@
           </a:prstGeom>
         </p:spPr>
       </p:pic>
+      <p:sp>
+        <p:nvSpPr>
+          <p:cNvPr id="4" name="Slide Number Placeholder 3">
+            <a:extLst>
+              <a:ext uri="{FF2B5EF4-FFF2-40B4-BE49-F238E27FC236}">
+                <a16:creationId xmlns:a16="http://schemas.microsoft.com/office/drawing/2014/main" id="{E2E46922-ADCF-4FEE-880F-C0085B7CF51D}"/>
+              </a:ext>
+            </a:extLst>
+          </p:cNvPr>
+          <p:cNvSpPr>
+            <a:spLocks noGrp="1"/>
+          </p:cNvSpPr>
+          <p:nvPr>
+            <p:ph type="sldNum" sz="quarter" idx="12"/>
+          </p:nvPr>
+        </p:nvSpPr>
+        <p:spPr/>
+        <p:txBody>
+          <a:bodyPr/>
+          <a:lstStyle/>
+          <a:p>
+            <a:fld id="{48EAAD28-6291-48B7-87C0-79E56BC93411}" type="slidenum">
+              <a:rPr lang="en-US" smtClean="0"/>
+              <a:t>7</a:t>
+            </a:fld>
+            <a:endParaRPr lang="en-US"/>
+          </a:p>
+        </p:txBody>
+      </p:sp>
     </p:spTree>
     <p:extLst>
       <p:ext uri="{BB962C8B-B14F-4D97-AF65-F5344CB8AC3E}">
-        <p14:creationId xmlns:p14="http://schemas.microsoft.com/office/powerpoint/2010/main" val="1763852582"/>
+        <p14:creationId xmlns:p14="http://schemas.microsoft.com/office/powerpoint/2010/main" val="2509752334"/>
       </p:ext>
     </p:extLst>
   </p:cSld>
@@ -2095,7 +2854,7 @@
           <p:cNvPr id="2" name="Title 1" hidden="1">
             <a:extLst>
               <a:ext uri="{FF2B5EF4-FFF2-40B4-BE49-F238E27FC236}">
-                <a16:creationId xmlns:a16="http://schemas.microsoft.com/office/drawing/2014/main" id="{3943BECB-1D3C-4BBB-9FF1-9B04C9A60463}"/>
+                <a16:creationId xmlns:a16="http://schemas.microsoft.com/office/drawing/2014/main" id="{66810DB1-C83E-4E9A-8EAE-A36505BB6A07}"/>
               </a:ext>
             </a:extLst>
           </p:cNvPr>
@@ -2120,7 +2879,7 @@
           <p:cNvPr id="3" name="Picture 2">
             <a:extLst>
               <a:ext uri="{FF2B5EF4-FFF2-40B4-BE49-F238E27FC236}">
-                <a16:creationId xmlns:a16="http://schemas.microsoft.com/office/drawing/2014/main" id="{B9501FB7-FF0B-44FF-A339-A4DEFDFDB297}"/>
+                <a16:creationId xmlns:a16="http://schemas.microsoft.com/office/drawing/2014/main" id="{A9D1C420-8B09-4A7B-B7E1-506119B3C581}"/>
               </a:ext>
             </a:extLst>
           </p:cNvPr>
@@ -2143,10 +2902,39 @@
           </a:prstGeom>
         </p:spPr>
       </p:pic>
+      <p:sp>
+        <p:nvSpPr>
+          <p:cNvPr id="4" name="Slide Number Placeholder 3">
+            <a:extLst>
+              <a:ext uri="{FF2B5EF4-FFF2-40B4-BE49-F238E27FC236}">
+                <a16:creationId xmlns:a16="http://schemas.microsoft.com/office/drawing/2014/main" id="{7E6C8319-370A-4143-B28B-530493C3133A}"/>
+              </a:ext>
+            </a:extLst>
+          </p:cNvPr>
+          <p:cNvSpPr>
+            <a:spLocks noGrp="1"/>
+          </p:cNvSpPr>
+          <p:nvPr>
+            <p:ph type="sldNum" sz="quarter" idx="12"/>
+          </p:nvPr>
+        </p:nvSpPr>
+        <p:spPr/>
+        <p:txBody>
+          <a:bodyPr/>
+          <a:lstStyle/>
+          <a:p>
+            <a:fld id="{48EAAD28-6291-48B7-87C0-79E56BC93411}" type="slidenum">
+              <a:rPr lang="en-US" smtClean="0"/>
+              <a:t>8</a:t>
+            </a:fld>
+            <a:endParaRPr lang="en-US"/>
+          </a:p>
+        </p:txBody>
+      </p:sp>
     </p:spTree>
     <p:extLst>
       <p:ext uri="{BB962C8B-B14F-4D97-AF65-F5344CB8AC3E}">
-        <p14:creationId xmlns:p14="http://schemas.microsoft.com/office/powerpoint/2010/main" val="2077890864"/>
+        <p14:creationId xmlns:p14="http://schemas.microsoft.com/office/powerpoint/2010/main" val="299515537"/>
       </p:ext>
     </p:extLst>
   </p:cSld>
@@ -2184,7 +2972,7 @@
           <p:cNvPr id="2" name="Title 1" hidden="1">
             <a:extLst>
               <a:ext uri="{FF2B5EF4-FFF2-40B4-BE49-F238E27FC236}">
-                <a16:creationId xmlns:a16="http://schemas.microsoft.com/office/drawing/2014/main" id="{395EBBF7-8D04-4674-B083-4F2AE945522A}"/>
+                <a16:creationId xmlns:a16="http://schemas.microsoft.com/office/drawing/2014/main" id="{F87B0301-C147-4738-BA29-2363A9875F18}"/>
               </a:ext>
             </a:extLst>
           </p:cNvPr>
@@ -2209,7 +2997,7 @@
           <p:cNvPr id="3" name="Picture 2">
             <a:extLst>
               <a:ext uri="{FF2B5EF4-FFF2-40B4-BE49-F238E27FC236}">
-                <a16:creationId xmlns:a16="http://schemas.microsoft.com/office/drawing/2014/main" id="{1D58E410-1CFD-479E-B131-45945BFB975C}"/>
+                <a16:creationId xmlns:a16="http://schemas.microsoft.com/office/drawing/2014/main" id="{7F758E48-564F-4910-9CF4-2C63C84BCB29}"/>
               </a:ext>
             </a:extLst>
           </p:cNvPr>
@@ -2232,10 +3020,39 @@
           </a:prstGeom>
         </p:spPr>
       </p:pic>
+      <p:sp>
+        <p:nvSpPr>
+          <p:cNvPr id="4" name="Slide Number Placeholder 3">
+            <a:extLst>
+              <a:ext uri="{FF2B5EF4-FFF2-40B4-BE49-F238E27FC236}">
+                <a16:creationId xmlns:a16="http://schemas.microsoft.com/office/drawing/2014/main" id="{9DC7E01E-9461-4575-9FA4-72944EE1AA21}"/>
+              </a:ext>
+            </a:extLst>
+          </p:cNvPr>
+          <p:cNvSpPr>
+            <a:spLocks noGrp="1"/>
+          </p:cNvSpPr>
+          <p:nvPr>
+            <p:ph type="sldNum" sz="quarter" idx="12"/>
+          </p:nvPr>
+        </p:nvSpPr>
+        <p:spPr/>
+        <p:txBody>
+          <a:bodyPr/>
+          <a:lstStyle/>
+          <a:p>
+            <a:fld id="{48EAAD28-6291-48B7-87C0-79E56BC93411}" type="slidenum">
+              <a:rPr lang="en-US" smtClean="0"/>
+              <a:t>9</a:t>
+            </a:fld>
+            <a:endParaRPr lang="en-US"/>
+          </a:p>
+        </p:txBody>
+      </p:sp>
     </p:spTree>
     <p:extLst>
       <p:ext uri="{BB962C8B-B14F-4D97-AF65-F5344CB8AC3E}">
-        <p14:creationId xmlns:p14="http://schemas.microsoft.com/office/powerpoint/2010/main" val="1574551419"/>
+        <p14:creationId xmlns:p14="http://schemas.microsoft.com/office/powerpoint/2010/main" val="868566443"/>
       </p:ext>
     </p:extLst>
   </p:cSld>
@@ -2538,4 +3355,299 @@
     </a:ext>
   </a:extLst>
 </a:theme>
+</file>
+
+<file path=ppt/theme/theme2.xml><?xml version="1.0" encoding="utf-8"?>
+<a:theme xmlns:a="http://schemas.openxmlformats.org/drawingml/2006/main" name="Office Theme">
+  <a:themeElements>
+    <a:clrScheme name="Office">
+      <a:dk1>
+        <a:sysClr val="windowText" lastClr="000000"/>
+      </a:dk1>
+      <a:lt1>
+        <a:sysClr val="window" lastClr="FFFFFF"/>
+      </a:lt1>
+      <a:dk2>
+        <a:srgbClr val="44546A"/>
+      </a:dk2>
+      <a:lt2>
+        <a:srgbClr val="E7E6E6"/>
+      </a:lt2>
+      <a:accent1>
+        <a:srgbClr val="4472C4"/>
+      </a:accent1>
+      <a:accent2>
+        <a:srgbClr val="ED7D31"/>
+      </a:accent2>
+      <a:accent3>
+        <a:srgbClr val="A5A5A5"/>
+      </a:accent3>
+      <a:accent4>
+        <a:srgbClr val="FFC000"/>
+      </a:accent4>
+      <a:accent5>
+        <a:srgbClr val="5B9BD5"/>
+      </a:accent5>
+      <a:accent6>
+        <a:srgbClr val="70AD47"/>
+      </a:accent6>
+      <a:hlink>
+        <a:srgbClr val="0563C1"/>
+      </a:hlink>
+      <a:folHlink>
+        <a:srgbClr val="954F72"/>
+      </a:folHlink>
+    </a:clrScheme>
+    <a:fontScheme name="Office">
+      <a:majorFont>
+        <a:latin typeface="Calibri Light" panose="020F0302020204030204"/>
+        <a:ea typeface=""/>
+        <a:cs typeface=""/>
+        <a:font script="Jpan" typeface="游ゴシック Light"/>
+        <a:font script="Hang" typeface="맑은 고딕"/>
+        <a:font script="Hans" typeface="等线 Light"/>
+        <a:font script="Hant" typeface="新細明體"/>
+        <a:font script="Arab" typeface="Times New Roman"/>
+        <a:font script="Hebr" typeface="Times New Roman"/>
+        <a:font script="Thai" typeface="Angsana New"/>
+        <a:font script="Ethi" typeface="Nyala"/>
+        <a:font script="Beng" typeface="Vrinda"/>
+        <a:font script="Gujr" typeface="Shruti"/>
+        <a:font script="Khmr" typeface="MoolBoran"/>
+        <a:font script="Knda" typeface="Tunga"/>
+        <a:font script="Guru" typeface="Raavi"/>
+        <a:font script="Cans" typeface="Euphemia"/>
+        <a:font script="Cher" typeface="Plantagenet Cherokee"/>
+        <a:font script="Yiii" typeface="Microsoft Yi Baiti"/>
+        <a:font script="Tibt" typeface="Microsoft Himalaya"/>
+        <a:font script="Thaa" typeface="MV Boli"/>
+        <a:font script="Deva" typeface="Mangal"/>
+        <a:font script="Telu" typeface="Gautami"/>
+        <a:font script="Taml" typeface="Latha"/>
+        <a:font script="Syrc" typeface="Estrangelo Edessa"/>
+        <a:font script="Orya" typeface="Kalinga"/>
+        <a:font script="Mlym" typeface="Kartika"/>
+        <a:font script="Laoo" typeface="DokChampa"/>
+        <a:font script="Sinh" typeface="Iskoola Pota"/>
+        <a:font script="Mong" typeface="Mongolian Baiti"/>
+        <a:font script="Viet" typeface="Times New Roman"/>
+        <a:font script="Uigh" typeface="Microsoft Uighur"/>
+        <a:font script="Geor" typeface="Sylfaen"/>
+        <a:font script="Armn" typeface="Arial"/>
+        <a:font script="Bugi" typeface="Leelawadee UI"/>
+        <a:font script="Bopo" typeface="Microsoft JhengHei"/>
+        <a:font script="Java" typeface="Javanese Text"/>
+        <a:font script="Lisu" typeface="Segoe UI"/>
+        <a:font script="Mymr" typeface="Myanmar Text"/>
+        <a:font script="Nkoo" typeface="Ebrima"/>
+        <a:font script="Olck" typeface="Nirmala UI"/>
+        <a:font script="Osma" typeface="Ebrima"/>
+        <a:font script="Phag" typeface="Phagspa"/>
+        <a:font script="Syrn" typeface="Estrangelo Edessa"/>
+        <a:font script="Syrj" typeface="Estrangelo Edessa"/>
+        <a:font script="Syre" typeface="Estrangelo Edessa"/>
+        <a:font script="Sora" typeface="Nirmala UI"/>
+        <a:font script="Tale" typeface="Microsoft Tai Le"/>
+        <a:font script="Talu" typeface="Microsoft New Tai Lue"/>
+        <a:font script="Tfng" typeface="Ebrima"/>
+      </a:majorFont>
+      <a:minorFont>
+        <a:latin typeface="Calibri" panose="020F0502020204030204"/>
+        <a:ea typeface=""/>
+        <a:cs typeface=""/>
+        <a:font script="Jpan" typeface="游ゴシック"/>
+        <a:font script="Hang" typeface="맑은 고딕"/>
+        <a:font script="Hans" typeface="等线"/>
+        <a:font script="Hant" typeface="新細明體"/>
+        <a:font script="Arab" typeface="Arial"/>
+        <a:font script="Hebr" typeface="Arial"/>
+        <a:font script="Thai" typeface="Cordia New"/>
+        <a:font script="Ethi" typeface="Nyala"/>
+        <a:font script="Beng" typeface="Vrinda"/>
+        <a:font script="Gujr" typeface="Shruti"/>
+        <a:font script="Khmr" typeface="DaunPenh"/>
+        <a:font script="Knda" typeface="Tunga"/>
+        <a:font script="Guru" typeface="Raavi"/>
+        <a:font script="Cans" typeface="Euphemia"/>
+        <a:font script="Cher" typeface="Plantagenet Cherokee"/>
+        <a:font script="Yiii" typeface="Microsoft Yi Baiti"/>
+        <a:font script="Tibt" typeface="Microsoft Himalaya"/>
+        <a:font script="Thaa" typeface="MV Boli"/>
+        <a:font script="Deva" typeface="Mangal"/>
+        <a:font script="Telu" typeface="Gautami"/>
+        <a:font script="Taml" typeface="Latha"/>
+        <a:font script="Syrc" typeface="Estrangelo Edessa"/>
+        <a:font script="Orya" typeface="Kalinga"/>
+        <a:font script="Mlym" typeface="Kartika"/>
+        <a:font script="Laoo" typeface="DokChampa"/>
+        <a:font script="Sinh" typeface="Iskoola Pota"/>
+        <a:font script="Mong" typeface="Mongolian Baiti"/>
+        <a:font script="Viet" typeface="Arial"/>
+        <a:font script="Uigh" typeface="Microsoft Uighur"/>
+        <a:font script="Geor" typeface="Sylfaen"/>
+        <a:font script="Armn" typeface="Arial"/>
+        <a:font script="Bugi" typeface="Leelawadee UI"/>
+        <a:font script="Bopo" typeface="Microsoft JhengHei"/>
+        <a:font script="Java" typeface="Javanese Text"/>
+        <a:font script="Lisu" typeface="Segoe UI"/>
+        <a:font script="Mymr" typeface="Myanmar Text"/>
+        <a:font script="Nkoo" typeface="Ebrima"/>
+        <a:font script="Olck" typeface="Nirmala UI"/>
+        <a:font script="Osma" typeface="Ebrima"/>
+        <a:font script="Phag" typeface="Phagspa"/>
+        <a:font script="Syrn" typeface="Estrangelo Edessa"/>
+        <a:font script="Syrj" typeface="Estrangelo Edessa"/>
+        <a:font script="Syre" typeface="Estrangelo Edessa"/>
+        <a:font script="Sora" typeface="Nirmala UI"/>
+        <a:font script="Tale" typeface="Microsoft Tai Le"/>
+        <a:font script="Talu" typeface="Microsoft New Tai Lue"/>
+        <a:font script="Tfng" typeface="Ebrima"/>
+      </a:minorFont>
+    </a:fontScheme>
+    <a:fmtScheme name="Office">
+      <a:fillStyleLst>
+        <a:solidFill>
+          <a:schemeClr val="phClr"/>
+        </a:solidFill>
+        <a:gradFill rotWithShape="1">
+          <a:gsLst>
+            <a:gs pos="0">
+              <a:schemeClr val="phClr">
+                <a:lumMod val="110000"/>
+                <a:satMod val="105000"/>
+                <a:tint val="67000"/>
+              </a:schemeClr>
+            </a:gs>
+            <a:gs pos="50000">
+              <a:schemeClr val="phClr">
+                <a:lumMod val="105000"/>
+                <a:satMod val="103000"/>
+                <a:tint val="73000"/>
+              </a:schemeClr>
+            </a:gs>
+            <a:gs pos="100000">
+              <a:schemeClr val="phClr">
+                <a:lumMod val="105000"/>
+                <a:satMod val="109000"/>
+                <a:tint val="81000"/>
+              </a:schemeClr>
+            </a:gs>
+          </a:gsLst>
+          <a:lin ang="5400000" scaled="0"/>
+        </a:gradFill>
+        <a:gradFill rotWithShape="1">
+          <a:gsLst>
+            <a:gs pos="0">
+              <a:schemeClr val="phClr">
+                <a:satMod val="103000"/>
+                <a:lumMod val="102000"/>
+                <a:tint val="94000"/>
+              </a:schemeClr>
+            </a:gs>
+            <a:gs pos="50000">
+              <a:schemeClr val="phClr">
+                <a:satMod val="110000"/>
+                <a:lumMod val="100000"/>
+                <a:shade val="100000"/>
+              </a:schemeClr>
+            </a:gs>
+            <a:gs pos="100000">
+              <a:schemeClr val="phClr">
+                <a:lumMod val="99000"/>
+                <a:satMod val="120000"/>
+                <a:shade val="78000"/>
+              </a:schemeClr>
+            </a:gs>
+          </a:gsLst>
+          <a:lin ang="5400000" scaled="0"/>
+        </a:gradFill>
+      </a:fillStyleLst>
+      <a:lnStyleLst>
+        <a:ln w="6350" cap="flat" cmpd="sng" algn="ctr">
+          <a:solidFill>
+            <a:schemeClr val="phClr"/>
+          </a:solidFill>
+          <a:prstDash val="solid"/>
+          <a:miter lim="800000"/>
+        </a:ln>
+        <a:ln w="12700" cap="flat" cmpd="sng" algn="ctr">
+          <a:solidFill>
+            <a:schemeClr val="phClr"/>
+          </a:solidFill>
+          <a:prstDash val="solid"/>
+          <a:miter lim="800000"/>
+        </a:ln>
+        <a:ln w="19050" cap="flat" cmpd="sng" algn="ctr">
+          <a:solidFill>
+            <a:schemeClr val="phClr"/>
+          </a:solidFill>
+          <a:prstDash val="solid"/>
+          <a:miter lim="800000"/>
+        </a:ln>
+      </a:lnStyleLst>
+      <a:effectStyleLst>
+        <a:effectStyle>
+          <a:effectLst/>
+        </a:effectStyle>
+        <a:effectStyle>
+          <a:effectLst/>
+        </a:effectStyle>
+        <a:effectStyle>
+          <a:effectLst>
+            <a:outerShdw blurRad="57150" dist="19050" dir="5400000" algn="ctr" rotWithShape="0">
+              <a:srgbClr val="000000">
+                <a:alpha val="63000"/>
+              </a:srgbClr>
+            </a:outerShdw>
+          </a:effectLst>
+        </a:effectStyle>
+      </a:effectStyleLst>
+      <a:bgFillStyleLst>
+        <a:solidFill>
+          <a:schemeClr val="phClr"/>
+        </a:solidFill>
+        <a:solidFill>
+          <a:schemeClr val="phClr">
+            <a:tint val="95000"/>
+            <a:satMod val="170000"/>
+          </a:schemeClr>
+        </a:solidFill>
+        <a:gradFill rotWithShape="1">
+          <a:gsLst>
+            <a:gs pos="0">
+              <a:schemeClr val="phClr">
+                <a:tint val="93000"/>
+                <a:satMod val="150000"/>
+                <a:shade val="98000"/>
+                <a:lumMod val="102000"/>
+              </a:schemeClr>
+            </a:gs>
+            <a:gs pos="50000">
+              <a:schemeClr val="phClr">
+                <a:tint val="98000"/>
+                <a:satMod val="130000"/>
+                <a:shade val="90000"/>
+                <a:lumMod val="103000"/>
+              </a:schemeClr>
+            </a:gs>
+            <a:gs pos="100000">
+              <a:schemeClr val="phClr">
+                <a:shade val="63000"/>
+                <a:satMod val="120000"/>
+              </a:schemeClr>
+            </a:gs>
+          </a:gsLst>
+          <a:lin ang="5400000" scaled="0"/>
+        </a:gradFill>
+      </a:bgFillStyleLst>
+    </a:fmtScheme>
+  </a:themeElements>
+  <a:objectDefaults/>
+  <a:extraClrSchemeLst/>
+  <a:extLst>
+    <a:ext uri="{05A4C25C-085E-4340-85A3-A5531E510DB2}">
+      <thm15:themeFamily xmlns:thm15="http://schemas.microsoft.com/office/thememl/2012/main" name="Office Theme" id="{62F939B6-93AF-4DB8-9C6B-D6C7DFDC589F}" vid="{4A3C46E8-61CC-4603-A589-7422A47A8E4A}"/>
+    </a:ext>
+  </a:extLst>
+</a:theme>
 </file>
</xml_diff>